<commit_message>
fixed chart sizing bug.
</commit_message>
<xml_diff>
--- a/docs/GSUR Poster 2023.pptx
+++ b/docs/GSUR Poster 2023.pptx
@@ -166,6 +166,66 @@
 </p:cmAuthorLst>
 </file>
 
+<file path=ppt/comments/modernComment_100_0.xml><?xml version="1.0" encoding="utf-8"?>
+<p188:cmLst xmlns:a="http://schemas.openxmlformats.org/drawingml/2006/main" xmlns:r="http://schemas.openxmlformats.org/officeDocument/2006/relationships" xmlns:p188="http://schemas.microsoft.com/office/powerpoint/2018/8/main">
+  <p188:cm id="{E3AADB81-8657-4E4F-8A67-DC698AEFE5CD}" authorId="{DAD23248-A83F-E40F-F2E8-AEAF3F08831F}" created="2023-04-18T16:55:53.746">
+    <ac:txMkLst xmlns:ac="http://schemas.microsoft.com/office/drawing/2013/main/command">
+      <pc:docMk xmlns:pc="http://schemas.microsoft.com/office/powerpoint/2013/main/command"/>
+      <pc:sldMk xmlns:pc="http://schemas.microsoft.com/office/powerpoint/2013/main/command" cId="0" sldId="256"/>
+      <ac:spMk id="24" creationId="{1984BDD8-054E-F26E-127E-38E755749789}"/>
+      <ac:txMk cp="61">
+        <ac:context len="186" hash="1783560585"/>
+      </ac:txMk>
+    </ac:txMkLst>
+    <p188:pos x="11551417" y="1592043"/>
+    <p188:txBody>
+      <a:bodyPr/>
+      <a:lstStyle/>
+      <a:p>
+        <a:r>
+          <a:rPr lang="en-US"/>
+          <a:t>Could add in something about the need for flexibility in this system so that researchers can flexibly alter the EMMA app use attributes that they want to investigate</a:t>
+        </a:r>
+      </a:p>
+    </p188:txBody>
+  </p188:cm>
+  <p188:cm id="{65879002-02DF-0E4D-8B9A-7D005155A8A8}" authorId="{DAD23248-A83F-E40F-F2E8-AEAF3F08831F}" created="2023-04-18T16:58:10.963">
+    <ac:txMkLst xmlns:ac="http://schemas.microsoft.com/office/drawing/2013/main/command">
+      <pc:docMk xmlns:pc="http://schemas.microsoft.com/office/powerpoint/2013/main/command"/>
+      <pc:sldMk xmlns:pc="http://schemas.microsoft.com/office/powerpoint/2013/main/command" cId="0" sldId="256"/>
+      <ac:spMk id="15" creationId="{2D6ABD85-328D-3946-E0A2-F3B9098EDAA7}"/>
+      <ac:txMk cp="0" len="152">
+        <ac:context len="153" hash="653479901"/>
+      </ac:txMk>
+    </ac:txMkLst>
+    <p188:replyLst>
+      <p188:reply id="{C3FD3553-4FC6-C648-93C9-9E6A569FFFBC}" authorId="{DAD23248-A83F-E40F-F2E8-AEAF3F08831F}" created="2023-04-18T16:58:34.274">
+        <p188:txBody>
+          <a:bodyPr/>
+          <a:lstStyle/>
+          <a:p>
+            <a:r>
+              <a:rPr lang="en-US"/>
+              <a:t>After the Figure 4 graph, you could state a blurb about future directions.</a:t>
+            </a:r>
+          </a:p>
+        </p188:txBody>
+      </p188:reply>
+    </p188:replyLst>
+    <p188:txBody>
+      <a:bodyPr/>
+      <a:lstStyle/>
+      <a:p>
+        <a:r>
+          <a:rPr lang="en-US"/>
+          <a:t>This could also be moved to the “Designing solution” section such that you state that the whole process was an iterative approach in which you met weekly with a researcher from the EMMA team to receive feedback and troubleshoot.</a:t>
+        </a:r>
+      </a:p>
+    </p188:txBody>
+  </p188:cm>
+</p188:cmLst>
+</file>
+
 <file path=ppt/notesMasters/notesMaster1.xml><?xml version="1.0" encoding="utf-8"?>
 <p:notesMaster xmlns:a="http://schemas.openxmlformats.org/drawingml/2006/main" xmlns:r="http://schemas.openxmlformats.org/officeDocument/2006/relationships" xmlns:p="http://schemas.openxmlformats.org/presentationml/2006/main">
   <p:cSld>
@@ -248,7 +308,7 @@
           <a:p>
             <a:fld id="{0B61CD23-E392-1F45-A220-C71AACFBF284}" type="datetimeFigureOut">
               <a:rPr lang="en-US" smtClean="0"/>
-              <a:t>4/17/2023</a:t>
+              <a:t>4/18/2023</a:t>
             </a:fld>
             <a:endParaRPr lang="en-US"/>
           </a:p>
@@ -748,7 +808,7 @@
           <a:p>
             <a:fld id="{1D8BD707-D9CF-40AE-B4C6-C98DA3205C09}" type="datetimeFigureOut">
               <a:rPr lang="en-US"/>
-              <a:t>4/17/2023</a:t>
+              <a:t>4/18/2023</a:t>
             </a:fld>
             <a:endParaRPr lang="en-US"/>
           </a:p>
@@ -924,7 +984,7 @@
           <a:p>
             <a:fld id="{1D8BD707-D9CF-40AE-B4C6-C98DA3205C09}" type="datetimeFigureOut">
               <a:rPr lang="en-US"/>
-              <a:t>4/17/2023</a:t>
+              <a:t>4/18/2023</a:t>
             </a:fld>
             <a:endParaRPr lang="en-US"/>
           </a:p>
@@ -1143,7 +1203,7 @@
           <a:p>
             <a:fld id="{1D8BD707-D9CF-40AE-B4C6-C98DA3205C09}" type="datetimeFigureOut">
               <a:rPr lang="en-US"/>
-              <a:t>4/17/2023</a:t>
+              <a:t>4/18/2023</a:t>
             </a:fld>
             <a:endParaRPr lang="en-US"/>
           </a:p>
@@ -1296,7 +1356,7 @@
           <a:p>
             <a:fld id="{1D8BD707-D9CF-40AE-B4C6-C98DA3205C09}" type="datetimeFigureOut">
               <a:rPr lang="en-US"/>
-              <a:t>4/17/2023</a:t>
+              <a:t>4/18/2023</a:t>
             </a:fld>
             <a:endParaRPr lang="en-US"/>
           </a:p>
@@ -1415,7 +1475,7 @@
           <a:p>
             <a:fld id="{1D8BD707-D9CF-40AE-B4C6-C98DA3205C09}" type="datetimeFigureOut">
               <a:rPr lang="en-US"/>
-              <a:t>4/17/2023</a:t>
+              <a:t>4/18/2023</a:t>
             </a:fld>
             <a:endParaRPr lang="en-US"/>
           </a:p>
@@ -1634,7 +1694,7 @@
           <a:p>
             <a:fld id="{1D8BD707-D9CF-40AE-B4C6-C98DA3205C09}" type="datetimeFigureOut">
               <a:rPr lang="en-US"/>
-              <a:t>4/17/2023</a:t>
+              <a:t>4/18/2023</a:t>
             </a:fld>
             <a:endParaRPr lang="en-US"/>
           </a:p>
@@ -1853,42 +1913,6 @@
           <a:chExt cx="0" cy="0"/>
         </a:xfrm>
       </p:grpSpPr>
-      <p:pic>
-        <p:nvPicPr>
-          <p:cNvPr id="22" name="Picture 21" descr="Diagram&#10;&#10;Description automatically generated">
-            <a:extLst>
-              <a:ext uri="{FF2B5EF4-FFF2-40B4-BE49-F238E27FC236}">
-                <a16:creationId xmlns:a16="http://schemas.microsoft.com/office/drawing/2014/main" id="{BA75EA4E-0916-DA9A-A8FB-10B1B3B31B25}"/>
-              </a:ext>
-            </a:extLst>
-          </p:cNvPr>
-          <p:cNvPicPr>
-            <a:picLocks noChangeAspect="1"/>
-          </p:cNvPicPr>
-          <p:nvPr/>
-        </p:nvPicPr>
-        <p:blipFill>
-          <a:blip r:embed="rId3">
-            <a:extLst>
-              <a:ext uri="{28A0092B-C50C-407E-A947-70E740481C1C}">
-                <a14:useLocalDpi xmlns:a14="http://schemas.microsoft.com/office/drawing/2010/main" val="0"/>
-              </a:ext>
-            </a:extLst>
-          </a:blip>
-          <a:stretch>
-            <a:fillRect/>
-          </a:stretch>
-        </p:blipFill>
-        <p:spPr>
-          <a:xfrm>
-            <a:off x="13064171" y="6211776"/>
-            <a:ext cx="11241396" cy="2734824"/>
-          </a:xfrm>
-          <a:prstGeom prst="rect">
-            <a:avLst/>
-          </a:prstGeom>
-        </p:spPr>
-      </p:pic>
       <p:sp>
         <p:nvSpPr>
           <p:cNvPr id="3" name="object 3"/>
@@ -1974,7 +1998,14 @@
             </a:pPr>
             <a:r>
               <a:rPr lang="en-US" sz="7001" spc="-11" dirty="0"/>
-              <a:t>Development of a Backend Calculation Algorithm and User Interface for an iOS Application for Older Adults</a:t>
+              <a:t>Development of Backend Calculation Algorithms and User Interface</a:t>
+            </a:r>
+            <a:br>
+              <a:rPr lang="en-US" sz="7001" spc="-11" dirty="0"/>
+            </a:br>
+            <a:r>
+              <a:rPr lang="en-US" sz="7001" spc="-11" dirty="0"/>
+              <a:t> for an iOS Application for Cognitively Impaired Older Adults</a:t>
             </a:r>
             <a:endParaRPr sz="7001" spc="-17" dirty="0"/>
           </a:p>
@@ -1989,7 +2020,7 @@
         <p:spPr>
           <a:xfrm>
             <a:off x="571760" y="4777279"/>
-            <a:ext cx="12167236" cy="25756282"/>
+            <a:ext cx="12167236" cy="9861674"/>
           </a:xfrm>
           <a:prstGeom prst="rect">
             <a:avLst/>
@@ -2017,7 +2048,7 @@
                 <a:latin typeface="Arial"/>
                 <a:cs typeface="Arial"/>
               </a:rPr>
-              <a:t>Scope…..</a:t>
+              <a:t>Scope</a:t>
             </a:r>
             <a:endParaRPr lang="en-US" sz="5400" dirty="0">
               <a:latin typeface="Arial"/>
@@ -2041,13 +2072,8 @@
                 <a:ea typeface="SimSun" panose="02010600030101010101" pitchFamily="2" charset="-122"/>
                 <a:cs typeface="Times New Roman" panose="02020603050405020304" pitchFamily="18" charset="0"/>
               </a:rPr>
-              <a:t>Older adults’ performances on cognitive tests in a clinical setting do not always accurately represent their self-perceived daily experiences. </a:t>
-            </a:r>
-            <a:endParaRPr lang="en-US" sz="4000" dirty="0">
-              <a:latin typeface="Calibri"/>
-              <a:ea typeface="SimSun"/>
-              <a:cs typeface="Times New Roman"/>
-            </a:endParaRPr>
+              <a:t>The Electronic Memory and Management Aid (EMMA) is an iOS tablet application developed by the WSU Neuropsychology and Aging Laboratory to serve as a memory intervention for older adults experiencing cognitive decline.</a:t>
+            </a:r>
           </a:p>
           <a:p>
             <a:pPr marL="398885" marR="575194" indent="-398885">
@@ -2062,11 +2088,11 @@
             </a:pPr>
             <a:r>
               <a:rPr lang="en-US" sz="4000" dirty="0">
-                <a:latin typeface="Calibri"/>
-                <a:ea typeface="SimSun"/>
-                <a:cs typeface="Times New Roman"/>
-              </a:rPr>
-              <a:t>Ecological momentary assessment (EMA) is useful for tracking daily experiences, such as cognitive fluctuations.</a:t>
+                <a:latin typeface="Calibri" panose="020F0502020204030204" pitchFamily="34" charset="0"/>
+                <a:ea typeface="SimSun" panose="02010600030101010101" pitchFamily="2" charset="-122"/>
+                <a:cs typeface="Times New Roman" panose="02020603050405020304" pitchFamily="18" charset="0"/>
+              </a:rPr>
+              <a:t>The EMMA app is currently being used by neuropsychologists in multiple research studies to explore its experimental and clinical utility.</a:t>
             </a:r>
           </a:p>
           <a:p>
@@ -2082,11 +2108,11 @@
             </a:pPr>
             <a:r>
               <a:rPr lang="en-US" sz="4000" dirty="0">
-                <a:latin typeface="Calibri"/>
-                <a:ea typeface="SimSun"/>
-                <a:cs typeface="Times New Roman"/>
-              </a:rPr>
-              <a:t>EMA was delivered via smartwatches to investigate dynamic associations between older adults’ fluctuations in cognitive performance and self-reports of current internal and external contextual states over seven days.</a:t>
+                <a:latin typeface="Calibri" panose="020F0502020204030204" pitchFamily="34" charset="0"/>
+                <a:ea typeface="SimSun" panose="02010600030101010101" pitchFamily="2" charset="-122"/>
+                <a:cs typeface="Times New Roman" panose="02020603050405020304" pitchFamily="18" charset="0"/>
+              </a:rPr>
+              <a:t>Project Need: Researchers and clinicians need to examine how participants use EMMA and the effectiveness of experimental manipulations</a:t>
             </a:r>
           </a:p>
           <a:p>
@@ -2102,20 +2128,15 @@
             </a:pPr>
             <a:r>
               <a:rPr lang="en-US" sz="4000" dirty="0">
-                <a:latin typeface="Calibri"/>
-                <a:ea typeface="SimSun"/>
-                <a:cs typeface="Times New Roman"/>
-              </a:rPr>
-              <a:t> Hypotheses: </a:t>
-            </a:r>
-            <a:endParaRPr lang="en-US" sz="4000" dirty="0">
-              <a:latin typeface="Calibri" panose="020F0502020204030204" pitchFamily="34" charset="0"/>
-              <a:ea typeface="SimSun" panose="02010600030101010101" pitchFamily="2" charset="-122"/>
-              <a:cs typeface="Times New Roman" panose="02020603050405020304" pitchFamily="18" charset="0"/>
-            </a:endParaRPr>
-          </a:p>
-          <a:p>
-            <a:pPr marL="1291687" marR="575194" lvl="1" indent="-398885">
+                <a:latin typeface="Calibri" panose="020F0502020204030204" pitchFamily="34" charset="0"/>
+                <a:ea typeface="SimSun" panose="02010600030101010101" pitchFamily="2" charset="-122"/>
+                <a:cs typeface="Times New Roman" panose="02020603050405020304" pitchFamily="18" charset="0"/>
+              </a:rPr>
+              <a:t>Project Aim 1: Develop an algorithm system to calculate summary variables of EMMA app use</a:t>
+            </a:r>
+          </a:p>
+          <a:p>
+            <a:pPr marL="398885" marR="575194" indent="-398885">
               <a:lnSpc>
                 <a:spcPts val="4085"/>
               </a:lnSpc>
@@ -2127,289 +2148,26 @@
             </a:pPr>
             <a:r>
               <a:rPr lang="en-US" sz="4000" dirty="0">
-                <a:latin typeface="Calibri"/>
-                <a:ea typeface="SimSun"/>
-                <a:cs typeface="Times New Roman"/>
-              </a:rPr>
-              <a:t>1) Cognitive performance will fluctuate throughout the week within and across days. </a:t>
-            </a:r>
-            <a:endParaRPr lang="en-US" sz="4000" dirty="0">
-              <a:latin typeface="Calibri" panose="020F0502020204030204" pitchFamily="34" charset="0"/>
-              <a:ea typeface="SimSun" panose="02010600030101010101" pitchFamily="2" charset="-122"/>
-              <a:cs typeface="Times New Roman" panose="02020603050405020304" pitchFamily="18" charset="0"/>
-            </a:endParaRPr>
-          </a:p>
-          <a:p>
-            <a:pPr marL="1291687" marR="575194" lvl="1" indent="-398885">
+                <a:latin typeface="Calibri" panose="020F0502020204030204" pitchFamily="34" charset="0"/>
+                <a:ea typeface="SimSun" panose="02010600030101010101" pitchFamily="2" charset="-122"/>
+                <a:cs typeface="Times New Roman" panose="02020603050405020304" pitchFamily="18" charset="0"/>
+              </a:rPr>
+              <a:t>Project Aim 2: Design a web-based user interface for clinicians to view a snapshot of EMMA app use</a:t>
+            </a:r>
+          </a:p>
+          <a:p>
+            <a:pPr marR="575194">
               <a:lnSpc>
                 <a:spcPts val="4085"/>
               </a:lnSpc>
               <a:spcBef>
                 <a:spcPts val="1182"/>
               </a:spcBef>
-              <a:buFont typeface="Wingdings" pitchFamily="2" charset="2"/>
-              <a:buChar char="§"/>
-            </a:pPr>
-            <a:r>
-              <a:rPr lang="en-US" sz="4000" dirty="0">
-                <a:latin typeface="Calibri"/>
-                <a:ea typeface="SimSun"/>
-                <a:cs typeface="Times New Roman"/>
-              </a:rPr>
-              <a:t>2) Cognitive performance will fluctuate in conjunction with internal and external contexts.</a:t>
-            </a:r>
-          </a:p>
-          <a:p>
-            <a:pPr marL="892802" marR="575194" lvl="1">
-              <a:lnSpc>
-                <a:spcPts val="4085"/>
-              </a:lnSpc>
-              <a:spcBef>
-                <a:spcPts val="2102"/>
-              </a:spcBef>
             </a:pPr>
             <a:endParaRPr lang="en-US" sz="3600" dirty="0">
               <a:latin typeface="Calibri"/>
               <a:ea typeface="SimSun"/>
               <a:cs typeface="Times New Roman"/>
-            </a:endParaRPr>
-          </a:p>
-          <a:p>
-            <a:pPr marR="575194" algn="just">
-              <a:lnSpc>
-                <a:spcPts val="4085"/>
-              </a:lnSpc>
-              <a:spcBef>
-                <a:spcPts val="2102"/>
-              </a:spcBef>
-            </a:pPr>
-            <a:r>
-              <a:rPr lang="en-US" sz="5400" b="1" cap="all" spc="258" dirty="0">
-                <a:solidFill>
-                  <a:srgbClr val="A80432"/>
-                </a:solidFill>
-                <a:latin typeface="Arial"/>
-                <a:cs typeface="Arial"/>
-              </a:rPr>
-              <a:t>…..</a:t>
-            </a:r>
-            <a:endParaRPr lang="en-US" sz="5400" b="1" cap="all" dirty="0">
-              <a:solidFill>
-                <a:srgbClr val="A80432"/>
-              </a:solidFill>
-              <a:latin typeface="Arial"/>
-              <a:cs typeface="Arial"/>
-            </a:endParaRPr>
-          </a:p>
-          <a:p>
-            <a:pPr marL="562691" indent="-562691">
-              <a:spcBef>
-                <a:spcPts val="1182"/>
-              </a:spcBef>
-              <a:buFont typeface="Arial" panose="020B0604020202020204" pitchFamily="34" charset="0"/>
-              <a:buChar char="•"/>
-            </a:pPr>
-            <a:r>
-              <a:rPr lang="en-US" sz="4000" dirty="0">
-                <a:latin typeface="Calibri"/>
-                <a:ea typeface="SimSun"/>
-                <a:cs typeface="Times New Roman"/>
-              </a:rPr>
-              <a:t>Participants: 28 community-dwelling older adults recruited for a larger clinical trial assessing lifestyle factors and compensatory strategy use on cognitive health.</a:t>
-            </a:r>
-          </a:p>
-          <a:p>
-            <a:pPr marL="562691" indent="-562691">
-              <a:spcBef>
-                <a:spcPts val="1182"/>
-              </a:spcBef>
-              <a:buFont typeface="Arial" panose="020B0604020202020204" pitchFamily="34" charset="0"/>
-              <a:buChar char="•"/>
-            </a:pPr>
-            <a:r>
-              <a:rPr lang="en-US" sz="4000" dirty="0">
-                <a:latin typeface="Calibri"/>
-                <a:ea typeface="SimSun"/>
-                <a:cs typeface="Times New Roman"/>
-              </a:rPr>
-              <a:t>Procedure: During week one of the clinical trial, participants received a smartwatch which sent prompts four times a day for seven days (total of 28 prompts, see Figures 2-4). </a:t>
-            </a:r>
-            <a:endParaRPr lang="en-US" sz="4000" dirty="0">
-              <a:latin typeface="Calibri" panose="020F0502020204030204" pitchFamily="34" charset="0"/>
-              <a:ea typeface="SimSun" panose="02010600030101010101" pitchFamily="2" charset="-122"/>
-              <a:cs typeface="Times New Roman" panose="02020603050405020304" pitchFamily="18" charset="0"/>
-            </a:endParaRPr>
-          </a:p>
-          <a:p>
-            <a:pPr marL="562691" indent="-562691">
-              <a:spcBef>
-                <a:spcPts val="1182"/>
-              </a:spcBef>
-              <a:buFont typeface="Arial" panose="020B0604020202020204" pitchFamily="34" charset="0"/>
-              <a:buChar char="•"/>
-            </a:pPr>
-            <a:r>
-              <a:rPr lang="en-US" sz="4000" dirty="0">
-                <a:latin typeface="Calibri"/>
-                <a:ea typeface="SimSun"/>
-                <a:cs typeface="Times New Roman"/>
-              </a:rPr>
-              <a:t>The data collection included:</a:t>
-            </a:r>
-            <a:endParaRPr lang="en-US" sz="4000" dirty="0">
-              <a:latin typeface="Calibri" panose="020F0502020204030204" pitchFamily="34" charset="0"/>
-              <a:ea typeface="SimSun" panose="02010600030101010101" pitchFamily="2" charset="-122"/>
-              <a:cs typeface="Times New Roman" panose="02020603050405020304" pitchFamily="18" charset="0"/>
-            </a:endParaRPr>
-          </a:p>
-          <a:p>
-            <a:pPr marL="1454242" lvl="1" indent="-562691">
-              <a:spcBef>
-                <a:spcPts val="1182"/>
-              </a:spcBef>
-              <a:buFont typeface="Arial" panose="020B0604020202020204" pitchFamily="34" charset="0"/>
-              <a:buChar char="•"/>
-            </a:pPr>
-            <a:r>
-              <a:rPr lang="en-US" sz="4000" dirty="0">
-                <a:latin typeface="Calibri"/>
-                <a:ea typeface="SimSun"/>
-                <a:cs typeface="Times New Roman"/>
-              </a:rPr>
-              <a:t> A 45-second one-back shape test (see Figure 1).</a:t>
-            </a:r>
-            <a:endParaRPr lang="en-US" sz="4000" dirty="0">
-              <a:latin typeface="Calibri" panose="020F0502020204030204" pitchFamily="34" charset="0"/>
-              <a:ea typeface="SimSun" panose="02010600030101010101" pitchFamily="2" charset="-122"/>
-              <a:cs typeface="Times New Roman" panose="02020603050405020304" pitchFamily="18" charset="0"/>
-            </a:endParaRPr>
-          </a:p>
-          <a:p>
-            <a:pPr marL="1454242" lvl="1" indent="-562691">
-              <a:spcBef>
-                <a:spcPts val="1182"/>
-              </a:spcBef>
-              <a:buFont typeface="Arial" panose="020B0604020202020204" pitchFamily="34" charset="0"/>
-              <a:buChar char="•"/>
-            </a:pPr>
-            <a:r>
-              <a:rPr lang="en-US" sz="4000" dirty="0">
-                <a:latin typeface="Calibri"/>
-                <a:ea typeface="SimSun"/>
-                <a:cs typeface="Times New Roman"/>
-              </a:rPr>
-              <a:t>Likert-style questions assessing participants’ experiences</a:t>
-            </a:r>
-            <a:endParaRPr lang="en-US" sz="4000" dirty="0">
-              <a:latin typeface="Calibri" panose="020F0502020204030204" pitchFamily="34" charset="0"/>
-              <a:ea typeface="SimSun" panose="02010600030101010101" pitchFamily="2" charset="-122"/>
-              <a:cs typeface="Times New Roman" panose="02020603050405020304" pitchFamily="18" charset="0"/>
-            </a:endParaRPr>
-          </a:p>
-          <a:p>
-            <a:pPr marL="2347044" lvl="2" indent="-562691">
-              <a:spcBef>
-                <a:spcPts val="1182"/>
-              </a:spcBef>
-              <a:buFont typeface="Arial" panose="020B0604020202020204" pitchFamily="34" charset="0"/>
-              <a:buChar char="•"/>
-            </a:pPr>
-            <a:r>
-              <a:rPr lang="en-US" sz="4000" dirty="0">
-                <a:latin typeface="Calibri"/>
-                <a:ea typeface="SimSun"/>
-                <a:cs typeface="Times New Roman"/>
-              </a:rPr>
-              <a:t>Internal contexts: Right now, I feel (1) mentally sharp, (2) physically fatigued, (3) stressed. </a:t>
-            </a:r>
-            <a:endParaRPr lang="en-US" sz="4000" dirty="0">
-              <a:latin typeface="Calibri" panose="020F0502020204030204" pitchFamily="34" charset="0"/>
-              <a:ea typeface="SimSun" panose="02010600030101010101" pitchFamily="2" charset="-122"/>
-              <a:cs typeface="Times New Roman" panose="02020603050405020304" pitchFamily="18" charset="0"/>
-            </a:endParaRPr>
-          </a:p>
-          <a:p>
-            <a:pPr marL="2347044" lvl="2" indent="-562691">
-              <a:spcBef>
-                <a:spcPts val="1182"/>
-              </a:spcBef>
-              <a:buFont typeface="Arial" panose="020B0604020202020204" pitchFamily="34" charset="0"/>
-              <a:buChar char="•"/>
-            </a:pPr>
-            <a:r>
-              <a:rPr lang="en-US" sz="4000" dirty="0">
-                <a:latin typeface="Calibri"/>
-                <a:ea typeface="SimSun"/>
-                <a:cs typeface="Times New Roman"/>
-              </a:rPr>
-              <a:t>External contexts: (4) Right now my environment is distracting. Time of day of the response. </a:t>
-            </a:r>
-            <a:endParaRPr lang="en-US" sz="4000" dirty="0">
-              <a:latin typeface="Calibri" panose="020F0502020204030204" pitchFamily="34" charset="0"/>
-              <a:ea typeface="SimSun" panose="02010600030101010101" pitchFamily="2" charset="-122"/>
-              <a:cs typeface="Times New Roman" panose="02020603050405020304" pitchFamily="18" charset="0"/>
-            </a:endParaRPr>
-          </a:p>
-          <a:p>
-            <a:pPr marL="398885" marR="8753" indent="-398885">
-              <a:lnSpc>
-                <a:spcPts val="4085"/>
-              </a:lnSpc>
-              <a:spcBef>
-                <a:spcPts val="2102"/>
-              </a:spcBef>
-              <a:buFont typeface="Arial" panose="020B0604020202020204" pitchFamily="34" charset="0"/>
-              <a:buChar char="•"/>
-            </a:pPr>
-            <a:r>
-              <a:rPr lang="en-US" sz="4000" dirty="0">
-                <a:solidFill>
-                  <a:schemeClr val="tx1">
-                    <a:lumMod val="95000"/>
-                    <a:lumOff val="5000"/>
-                  </a:schemeClr>
-                </a:solidFill>
-                <a:latin typeface="Calibri"/>
-                <a:cs typeface="Arial"/>
-              </a:rPr>
-              <a:t>All study procedures were conducted at and approved by UC-Davis IRB.</a:t>
-            </a:r>
-            <a:r>
-              <a:rPr lang="en-US" sz="4000" cap="all" spc="11" dirty="0">
-                <a:solidFill>
-                  <a:schemeClr val="tx1">
-                    <a:lumMod val="95000"/>
-                    <a:lumOff val="5000"/>
-                  </a:schemeClr>
-                </a:solidFill>
-                <a:latin typeface="Arial"/>
-                <a:cs typeface="Arial"/>
-              </a:rPr>
-              <a:t> </a:t>
-            </a:r>
-            <a:endParaRPr lang="en-US" sz="4000" dirty="0">
-              <a:solidFill>
-                <a:schemeClr val="tx1">
-                  <a:lumMod val="95000"/>
-                  <a:lumOff val="5000"/>
-                </a:schemeClr>
-              </a:solidFill>
-              <a:latin typeface="Arial" panose="020B0604020202020204" pitchFamily="34" charset="0"/>
-              <a:cs typeface="Arial" panose="020B0604020202020204" pitchFamily="34" charset="0"/>
-            </a:endParaRPr>
-          </a:p>
-          <a:p>
-            <a:pPr marR="575194" algn="just">
-              <a:lnSpc>
-                <a:spcPts val="4666"/>
-              </a:lnSpc>
-              <a:spcBef>
-                <a:spcPts val="2102"/>
-              </a:spcBef>
-            </a:pPr>
-            <a:endParaRPr sz="3600" dirty="0">
-              <a:latin typeface="Arial" panose="020B0604020202020204" pitchFamily="34" charset="0"/>
-              <a:cs typeface="Arial" panose="020B0604020202020204" pitchFamily="34" charset="0"/>
             </a:endParaRPr>
           </a:p>
         </p:txBody>
@@ -2457,7 +2215,7 @@
                 <a:latin typeface="Arial"/>
                 <a:cs typeface="Arial"/>
               </a:rPr>
-              <a:t>Data Wrangling</a:t>
+              <a:t>Aim 1: Data Wrangling</a:t>
             </a:r>
             <a:endParaRPr sz="5400" b="1" cap="all" dirty="0">
               <a:solidFill>
@@ -2542,7 +2300,7 @@
                 <a:latin typeface="Arial"/>
                 <a:cs typeface="Arial"/>
               </a:rPr>
-              <a:t>Dashboard</a:t>
+              <a:t>aim 2: Dashboard</a:t>
             </a:r>
             <a:endParaRPr sz="5400" b="1" cap="all" dirty="0">
               <a:solidFill>
@@ -2587,7 +2345,7 @@
                 <a:latin typeface="Arial"/>
                 <a:cs typeface="Arial"/>
               </a:rPr>
-              <a:t>Figure 1. EMMA Variable Calculation Process</a:t>
+              <a:t>Figure 2. EMMA variable calculation process</a:t>
             </a:r>
             <a:endParaRPr lang="en-US" sz="3200" dirty="0">
               <a:latin typeface="Arial" panose="020B0604020202020204" pitchFamily="34" charset="0"/>
@@ -2611,7 +2369,7 @@
         <p:spPr>
           <a:xfrm>
             <a:off x="9047857" y="2554904"/>
-            <a:ext cx="25729759" cy="570325"/>
+            <a:ext cx="25729759" cy="647397"/>
           </a:xfrm>
           <a:prstGeom prst="rect">
             <a:avLst/>
@@ -2623,13 +2381,13 @@
           </a:bodyPr>
           <a:lstStyle/>
           <a:p>
-            <a:pPr marL="24259">
+            <a:pPr marL="24259" algn="ctr">
               <a:spcBef>
                 <a:spcPts val="248"/>
               </a:spcBef>
             </a:pPr>
             <a:r>
-              <a:rPr lang="en-US" sz="3499" spc="17" dirty="0">
+              <a:rPr lang="en-US" sz="4000" spc="17" dirty="0">
                 <a:solidFill>
                   <a:srgbClr val="FFFFFF"/>
                 </a:solidFill>
@@ -2639,17 +2397,17 @@
               <a:t>Reagan Kelley </a:t>
             </a:r>
             <a:r>
-              <a:rPr lang="en-US" sz="3499" spc="17" baseline="30000" dirty="0">
+              <a:rPr lang="en-US" sz="4000" spc="17" baseline="30000" dirty="0">
                 <a:solidFill>
                   <a:srgbClr val="FFFFFF"/>
                 </a:solidFill>
                 <a:latin typeface="Arial"/>
                 <a:cs typeface="Arial"/>
               </a:rPr>
-              <a:t>1</a:t>
-            </a:r>
-            <a:r>
-              <a:rPr lang="en-US" sz="3499" spc="17" dirty="0">
+              <a:t>2</a:t>
+            </a:r>
+            <a:r>
+              <a:rPr lang="en-US" sz="4000" spc="17" dirty="0">
                 <a:solidFill>
                   <a:srgbClr val="FFFFFF"/>
                 </a:solidFill>
@@ -2659,17 +2417,17 @@
               <a:t>, Catherine Luna</a:t>
             </a:r>
             <a:r>
-              <a:rPr lang="en-US" sz="3499" spc="17" baseline="30000" dirty="0">
+              <a:rPr lang="en-US" sz="4000" spc="17" baseline="30000" dirty="0">
                 <a:solidFill>
                   <a:srgbClr val="FFFFFF"/>
                 </a:solidFill>
                 <a:latin typeface="Arial"/>
                 <a:cs typeface="Arial"/>
               </a:rPr>
-              <a:t>2</a:t>
-            </a:r>
-            <a:r>
-              <a:rPr lang="en-US" sz="3499" spc="17" dirty="0">
+              <a:t>1</a:t>
+            </a:r>
+            <a:r>
+              <a:rPr lang="en-US" sz="4000" spc="17" dirty="0">
                 <a:solidFill>
                   <a:srgbClr val="FFFFFF"/>
                 </a:solidFill>
@@ -2679,17 +2437,17 @@
               <a:t>, Diane Cook</a:t>
             </a:r>
             <a:r>
-              <a:rPr lang="en-US" sz="3499" spc="17" baseline="30000" dirty="0">
+              <a:rPr lang="en-US" sz="4000" spc="17" baseline="30000" dirty="0">
                 <a:solidFill>
                   <a:srgbClr val="FFFFFF"/>
                 </a:solidFill>
                 <a:latin typeface="Arial"/>
                 <a:cs typeface="Arial"/>
               </a:rPr>
-              <a:t>1 </a:t>
-            </a:r>
-            <a:r>
-              <a:rPr lang="en-US" sz="3499" spc="17" dirty="0">
+              <a:t>2 </a:t>
+            </a:r>
+            <a:r>
+              <a:rPr lang="en-US" sz="4000" spc="17" dirty="0">
                 <a:solidFill>
                   <a:srgbClr val="FFFFFF"/>
                 </a:solidFill>
@@ -2699,7 +2457,7 @@
               <a:t>, &amp; Maureen Schmitter-Edgecombe</a:t>
             </a:r>
             <a:r>
-              <a:rPr lang="en-US" sz="3499" spc="17" baseline="30000" dirty="0">
+              <a:rPr lang="en-US" sz="4000" spc="17" baseline="30000" dirty="0">
                 <a:solidFill>
                   <a:srgbClr val="FFFFFF"/>
                 </a:solidFill>
@@ -2708,7 +2466,7 @@
               </a:rPr>
               <a:t>1</a:t>
             </a:r>
-            <a:endParaRPr sz="3499" dirty="0">
+            <a:endParaRPr sz="4000" dirty="0">
               <a:latin typeface="Arial"/>
               <a:cs typeface="Arial"/>
             </a:endParaRPr>
@@ -2797,8 +2555,8 @@
         </p:nvSpPr>
         <p:spPr>
           <a:xfrm>
-            <a:off x="12971127" y="15482122"/>
-            <a:ext cx="11491793" cy="3567350"/>
+            <a:off x="13065236" y="15621916"/>
+            <a:ext cx="11491793" cy="4029015"/>
           </a:xfrm>
           <a:prstGeom prst="rect">
             <a:avLst/>
@@ -2824,7 +2582,7 @@
                 <a:ea typeface="SimSun"/>
                 <a:cs typeface="Times New Roman"/>
               </a:rPr>
-              <a:t>Rigidly define variables through JSON attributes</a:t>
+              <a:t>We designed a variable definition interpreter that can understand the context of each variable definition.</a:t>
             </a:r>
           </a:p>
           <a:p>
@@ -2841,24 +2599,7 @@
                 <a:ea typeface="SimSun"/>
                 <a:cs typeface="Times New Roman"/>
               </a:rPr>
-              <a:t>Design a variable definition interpreter that can understand the context of each variable definition.</a:t>
-            </a:r>
-          </a:p>
-          <a:p>
-            <a:pPr marL="562691" indent="-562691">
-              <a:spcBef>
-                <a:spcPts val="1182"/>
-              </a:spcBef>
-              <a:buFont typeface="Arial" panose="020B0604020202020204" pitchFamily="34" charset="0"/>
-              <a:buChar char="•"/>
-            </a:pPr>
-            <a:r>
-              <a:rPr lang="en-US" sz="4000" dirty="0">
-                <a:latin typeface="Calibri"/>
-                <a:ea typeface="SimSun"/>
-                <a:cs typeface="Times New Roman"/>
-              </a:rPr>
-              <a:t>Use all variable definitions to create calculation tables from the weekly stream of data.</a:t>
+              <a:t>Read JSON attributes as parameters for variables, these parameters determines what app-use data to use and how to aggregate it.</a:t>
             </a:r>
           </a:p>
         </p:txBody>
@@ -2878,7 +2619,7 @@
         <p:spPr>
           <a:xfrm>
             <a:off x="24700844" y="5345177"/>
-            <a:ext cx="12882295" cy="1166693"/>
+            <a:ext cx="12882295" cy="674251"/>
           </a:xfrm>
           <a:prstGeom prst="rect">
             <a:avLst/>
@@ -2896,7 +2637,7 @@
                 <a:latin typeface="Arial"/>
                 <a:cs typeface="Arial"/>
               </a:rPr>
-              <a:t>Figure 2. Cross Correlation of N-Back Score with Feelings of Mental Sharpness</a:t>
+              <a:t>Figure 4. Snapshot of the EMMA dashboard home page</a:t>
             </a:r>
             <a:endParaRPr lang="en-US" sz="3200" dirty="0">
               <a:latin typeface="Arial" panose="020B0604020202020204" pitchFamily="34" charset="0"/>
@@ -2905,35 +2646,6 @@
           </a:p>
         </p:txBody>
       </p:sp>
-      <p:pic>
-        <p:nvPicPr>
-          <p:cNvPr id="16" name="Picture 15" descr="A picture containing text, sign&#10;&#10;Description automatically generated">
-            <a:extLst>
-              <a:ext uri="{FF2B5EF4-FFF2-40B4-BE49-F238E27FC236}">
-                <a16:creationId xmlns:a16="http://schemas.microsoft.com/office/drawing/2014/main" id="{7831CD02-D058-FBB7-FFB5-8700A0A34D28}"/>
-              </a:ext>
-            </a:extLst>
-          </p:cNvPr>
-          <p:cNvPicPr>
-            <a:picLocks noChangeAspect="1"/>
-          </p:cNvPicPr>
-          <p:nvPr/>
-        </p:nvPicPr>
-        <p:blipFill rotWithShape="1">
-          <a:blip r:embed="rId5"/>
-          <a:srcRect t="4767" r="52727"/>
-          <a:stretch/>
-        </p:blipFill>
-        <p:spPr>
-          <a:xfrm>
-            <a:off x="68150405" y="1531169"/>
-            <a:ext cx="8256912" cy="4370260"/>
-          </a:xfrm>
-          <a:prstGeom prst="rect">
-            <a:avLst/>
-          </a:prstGeom>
-        </p:spPr>
-      </p:pic>
       <p:sp>
         <p:nvSpPr>
           <p:cNvPr id="23" name="object 6">
@@ -2948,7 +2660,7 @@
         </p:nvSpPr>
         <p:spPr>
           <a:xfrm>
-            <a:off x="10553888" y="3060858"/>
+            <a:off x="11539238" y="3339808"/>
             <a:ext cx="21273165" cy="608285"/>
           </a:xfrm>
           <a:prstGeom prst="rect">
@@ -3047,8 +2759,8 @@
         </p:nvSpPr>
         <p:spPr>
           <a:xfrm>
-            <a:off x="12971127" y="10378284"/>
-            <a:ext cx="11729717" cy="3413462"/>
+            <a:off x="12971128" y="10378284"/>
+            <a:ext cx="11453608" cy="4336792"/>
           </a:xfrm>
           <a:prstGeom prst="rect">
             <a:avLst/>
@@ -3074,7 +2786,7 @@
                 <a:ea typeface="SimSun"/>
                 <a:cs typeface="Times New Roman"/>
               </a:rPr>
-              <a:t>Researchers have many ideas for variables that can be collected and measured from EMMA data.</a:t>
+              <a:t>JSON is good for reducing complexity into attribute notation</a:t>
             </a:r>
           </a:p>
           <a:p>
@@ -3091,7 +2803,41 @@
                 <a:ea typeface="SimSun"/>
                 <a:cs typeface="Times New Roman"/>
               </a:rPr>
-              <a:t>Problem: How to easily define new variables that can then be added to the data wrangling system, and how to store these calculations efficiently.</a:t>
+              <a:t>It is easy to read</a:t>
+            </a:r>
+          </a:p>
+          <a:p>
+            <a:pPr marL="562691" indent="-562691">
+              <a:spcBef>
+                <a:spcPts val="1182"/>
+              </a:spcBef>
+              <a:buFont typeface="Arial" panose="020B0604020202020204" pitchFamily="34" charset="0"/>
+              <a:buChar char="•"/>
+            </a:pPr>
+            <a:r>
+              <a:rPr lang="en-US" sz="4000" dirty="0">
+                <a:latin typeface="Calibri"/>
+                <a:ea typeface="SimSun"/>
+                <a:cs typeface="Times New Roman"/>
+              </a:rPr>
+              <a:t>Provides a quick and simple solution to implement new variable ideas.</a:t>
+            </a:r>
+          </a:p>
+          <a:p>
+            <a:pPr marL="562691" indent="-562691">
+              <a:spcBef>
+                <a:spcPts val="1182"/>
+              </a:spcBef>
+              <a:buFont typeface="Arial" panose="020B0604020202020204" pitchFamily="34" charset="0"/>
+              <a:buChar char="•"/>
+            </a:pPr>
+            <a:r>
+              <a:rPr lang="en-US" sz="4000" dirty="0">
+                <a:latin typeface="Calibri"/>
+                <a:ea typeface="SimSun"/>
+                <a:cs typeface="Times New Roman"/>
+              </a:rPr>
+              <a:t>It can be processed by code quickly</a:t>
             </a:r>
           </a:p>
         </p:txBody>
@@ -3139,7 +2885,7 @@
                 <a:latin typeface="Arial"/>
                 <a:cs typeface="Arial"/>
               </a:rPr>
-              <a:t>Problem</a:t>
+              <a:t>Why json?</a:t>
             </a:r>
             <a:endParaRPr sz="4000" b="1" cap="all" dirty="0">
               <a:solidFill>
@@ -3165,7 +2911,7 @@
         </p:nvSpPr>
         <p:spPr>
           <a:xfrm>
-            <a:off x="13478373" y="14671535"/>
+            <a:off x="13478373" y="14826232"/>
             <a:ext cx="9798316" cy="612988"/>
           </a:xfrm>
           <a:prstGeom prst="rect">
@@ -3194,7 +2940,7 @@
                 <a:latin typeface="Arial"/>
                 <a:cs typeface="Arial"/>
               </a:rPr>
-              <a:t>Solution</a:t>
+              <a:t>From json to code</a:t>
             </a:r>
             <a:endParaRPr sz="4000" b="1" cap="all" dirty="0">
               <a:solidFill>
@@ -3220,7 +2966,7 @@
         </p:nvSpPr>
         <p:spPr>
           <a:xfrm>
-            <a:off x="13221525" y="19246126"/>
+            <a:off x="13280259" y="19753534"/>
             <a:ext cx="11241395" cy="674251"/>
           </a:xfrm>
           <a:prstGeom prst="rect">
@@ -3239,7 +2985,7 @@
                 <a:latin typeface="Arial"/>
                 <a:cs typeface="Arial"/>
               </a:rPr>
-              <a:t>Figure 2. Sample Data wrangling output</a:t>
+              <a:t>Figure 3. Sample Data wrangling output</a:t>
             </a:r>
             <a:endParaRPr lang="en-US" sz="3200" dirty="0">
               <a:latin typeface="Arial" panose="020B0604020202020204" pitchFamily="34" charset="0"/>
@@ -3248,12 +2994,58 @@
           </a:p>
         </p:txBody>
       </p:sp>
+      <p:sp>
+        <p:nvSpPr>
+          <p:cNvPr id="42" name="TextBox 41">
+            <a:extLst>
+              <a:ext uri="{FF2B5EF4-FFF2-40B4-BE49-F238E27FC236}">
+                <a16:creationId xmlns:a16="http://schemas.microsoft.com/office/drawing/2014/main" id="{5FD5C935-2AC1-C4FA-552A-4B155B9BC261}"/>
+              </a:ext>
+            </a:extLst>
+          </p:cNvPr>
+          <p:cNvSpPr txBox="1"/>
+          <p:nvPr/>
+        </p:nvSpPr>
+        <p:spPr>
+          <a:xfrm>
+            <a:off x="12957832" y="29781571"/>
+            <a:ext cx="11491793" cy="2644021"/>
+          </a:xfrm>
+          <a:prstGeom prst="rect">
+            <a:avLst/>
+          </a:prstGeom>
+          <a:noFill/>
+        </p:spPr>
+        <p:txBody>
+          <a:bodyPr wrap="square" lIns="180052" tIns="90025" rIns="180052" bIns="90025" anchor="t">
+            <a:spAutoFit/>
+          </a:bodyPr>
+          <a:lstStyle/>
+          <a:p>
+            <a:pPr marL="562691" indent="-562691">
+              <a:spcBef>
+                <a:spcPts val="1182"/>
+              </a:spcBef>
+              <a:buFont typeface="Arial" panose="020B0604020202020204" pitchFamily="34" charset="0"/>
+              <a:buChar char="•"/>
+            </a:pPr>
+            <a:r>
+              <a:rPr lang="en-US" sz="4000" dirty="0">
+                <a:latin typeface="Calibri"/>
+                <a:ea typeface="SimSun"/>
+                <a:cs typeface="Times New Roman"/>
+              </a:rPr>
+              <a:t>With over 100 variable definitions currently defined, our latest version can calculate weekly calculation tables for hundreds of participants throughout multiple studies within seconds.</a:t>
+            </a:r>
+          </a:p>
+        </p:txBody>
+      </p:sp>
       <p:pic>
         <p:nvPicPr>
-          <p:cNvPr id="41" name="Picture 40">
+          <p:cNvPr id="7" name="Picture 6" descr="Table&#10;&#10;Description automatically generated">
             <a:extLst>
               <a:ext uri="{FF2B5EF4-FFF2-40B4-BE49-F238E27FC236}">
-                <a16:creationId xmlns:a16="http://schemas.microsoft.com/office/drawing/2014/main" id="{D6BFC5CD-53CE-98B8-1045-5DEF57814F7B}"/>
+                <a16:creationId xmlns:a16="http://schemas.microsoft.com/office/drawing/2014/main" id="{95281192-C678-AF83-0D06-8B8450B114AA}"/>
               </a:ext>
             </a:extLst>
           </p:cNvPr>
@@ -3263,15 +3055,21 @@
           <p:nvPr/>
         </p:nvPicPr>
         <p:blipFill>
-          <a:blip r:embed="rId6"/>
+          <a:blip r:embed="rId5">
+            <a:extLst>
+              <a:ext uri="{28A0092B-C50C-407E-A947-70E740481C1C}">
+                <a14:useLocalDpi xmlns:a14="http://schemas.microsoft.com/office/drawing/2010/main" val="0"/>
+              </a:ext>
+            </a:extLst>
+          </a:blip>
           <a:stretch>
             <a:fillRect/>
           </a:stretch>
         </p:blipFill>
         <p:spPr>
           <a:xfrm>
-            <a:off x="13190764" y="20239092"/>
-            <a:ext cx="11170789" cy="9084416"/>
+            <a:off x="24796755" y="6199999"/>
+            <a:ext cx="8160888" cy="5222412"/>
           </a:xfrm>
           <a:prstGeom prst="rect">
             <a:avLst/>
@@ -3286,10 +3084,10 @@
       </p:pic>
       <p:sp>
         <p:nvSpPr>
-          <p:cNvPr id="42" name="TextBox 41">
+          <p:cNvPr id="9" name="object 15">
             <a:extLst>
               <a:ext uri="{FF2B5EF4-FFF2-40B4-BE49-F238E27FC236}">
-                <a16:creationId xmlns:a16="http://schemas.microsoft.com/office/drawing/2014/main" id="{5FD5C935-2AC1-C4FA-552A-4B155B9BC261}"/>
+                <a16:creationId xmlns:a16="http://schemas.microsoft.com/office/drawing/2014/main" id="{71AF6EC6-B068-65D4-16AC-0D0F0B9C1F61}"/>
               </a:ext>
             </a:extLst>
           </p:cNvPr>
@@ -3298,8 +3096,63 @@
         </p:nvSpPr>
         <p:spPr>
           <a:xfrm>
-            <a:off x="12957832" y="29781571"/>
-            <a:ext cx="11491793" cy="2644021"/>
+            <a:off x="24847281" y="11745811"/>
+            <a:ext cx="9798316" cy="612988"/>
+          </a:xfrm>
+          <a:prstGeom prst="rect">
+            <a:avLst/>
+          </a:prstGeom>
+        </p:spPr>
+        <p:txBody>
+          <a:bodyPr vert="horz" wrap="square" lIns="0" tIns="0" rIns="0" bIns="0" rtlCol="0">
+            <a:spAutoFit/>
+          </a:bodyPr>
+          <a:lstStyle/>
+          <a:p>
+            <a:pPr>
+              <a:lnSpc>
+                <a:spcPts val="4666"/>
+              </a:lnSpc>
+              <a:tabLst>
+                <a:tab pos="3000684" algn="l"/>
+              </a:tabLst>
+            </a:pPr>
+            <a:r>
+              <a:rPr lang="en-US" sz="4000" b="1" cap="all" spc="258" dirty="0">
+                <a:solidFill>
+                  <a:srgbClr val="A80432"/>
+                </a:solidFill>
+                <a:latin typeface="Arial"/>
+                <a:cs typeface="Arial"/>
+              </a:rPr>
+              <a:t>User interface for clinicians</a:t>
+            </a:r>
+            <a:endParaRPr sz="4000" b="1" cap="all" dirty="0">
+              <a:solidFill>
+                <a:srgbClr val="A80432"/>
+              </a:solidFill>
+              <a:latin typeface="Arial"/>
+              <a:cs typeface="Arial"/>
+            </a:endParaRPr>
+          </a:p>
+        </p:txBody>
+      </p:sp>
+      <p:sp>
+        <p:nvSpPr>
+          <p:cNvPr id="10" name="TextBox 9">
+            <a:extLst>
+              <a:ext uri="{FF2B5EF4-FFF2-40B4-BE49-F238E27FC236}">
+                <a16:creationId xmlns:a16="http://schemas.microsoft.com/office/drawing/2014/main" id="{4101F794-D575-8BD4-49C3-2ACDC0EA86AD}"/>
+              </a:ext>
+            </a:extLst>
+          </p:cNvPr>
+          <p:cNvSpPr txBox="1"/>
+          <p:nvPr/>
+        </p:nvSpPr>
+        <p:spPr>
+          <a:xfrm>
+            <a:off x="24796755" y="12486965"/>
+            <a:ext cx="11729717" cy="3567350"/>
           </a:xfrm>
           <a:prstGeom prst="rect">
             <a:avLst/>
@@ -3307,7 +3160,7 @@
           <a:noFill/>
         </p:spPr>
         <p:txBody>
-          <a:bodyPr wrap="square" lIns="180052" tIns="90025" rIns="180052" bIns="90025" anchor="t">
+          <a:bodyPr wrap="square" lIns="180052" tIns="90025" rIns="180052" bIns="90025" rtlCol="0" anchor="t">
             <a:spAutoFit/>
           </a:bodyPr>
           <a:lstStyle/>
@@ -3325,16 +3178,748 @@
                 <a:ea typeface="SimSun"/>
                 <a:cs typeface="Times New Roman"/>
               </a:rPr>
-              <a:t>With over 100 variable definitions currently defined, our latest version can calculate weekly calculation tables for hundreds of participants throughout multiple studies within seconds.</a:t>
-            </a:r>
-          </a:p>
-        </p:txBody>
-      </p:sp>
+              <a:t>The dashboard brings the results from data wrangling back to the end user.</a:t>
+            </a:r>
+          </a:p>
+          <a:p>
+            <a:pPr marL="562691" indent="-562691">
+              <a:spcBef>
+                <a:spcPts val="1182"/>
+              </a:spcBef>
+              <a:buFont typeface="Arial" panose="020B0604020202020204" pitchFamily="34" charset="0"/>
+              <a:buChar char="•"/>
+            </a:pPr>
+            <a:r>
+              <a:rPr lang="en-US" sz="4000" dirty="0">
+                <a:latin typeface="Calibri"/>
+                <a:ea typeface="SimSun"/>
+                <a:cs typeface="Times New Roman"/>
+              </a:rPr>
+              <a:t>Retrieves back-end calculation tables and presents the variable data in a meaningful way.</a:t>
+            </a:r>
+          </a:p>
+          <a:p>
+            <a:pPr marL="562691" indent="-562691">
+              <a:spcBef>
+                <a:spcPts val="1182"/>
+              </a:spcBef>
+              <a:buFont typeface="Arial" panose="020B0604020202020204" pitchFamily="34" charset="0"/>
+              <a:buChar char="•"/>
+            </a:pPr>
+            <a:endParaRPr lang="en-US" sz="4000" dirty="0">
+              <a:latin typeface="Calibri"/>
+              <a:ea typeface="SimSun"/>
+              <a:cs typeface="Times New Roman"/>
+            </a:endParaRPr>
+          </a:p>
+        </p:txBody>
+      </p:sp>
+      <p:pic>
+        <p:nvPicPr>
+          <p:cNvPr id="12" name="Picture 11" descr="Text&#10;&#10;Description automatically generated with medium confidence">
+            <a:extLst>
+              <a:ext uri="{FF2B5EF4-FFF2-40B4-BE49-F238E27FC236}">
+                <a16:creationId xmlns:a16="http://schemas.microsoft.com/office/drawing/2014/main" id="{7B00503E-6346-550A-AAB0-B2A7C81DD248}"/>
+              </a:ext>
+            </a:extLst>
+          </p:cNvPr>
+          <p:cNvPicPr>
+            <a:picLocks noChangeAspect="1"/>
+          </p:cNvPicPr>
+          <p:nvPr/>
+        </p:nvPicPr>
+        <p:blipFill>
+          <a:blip r:embed="rId6">
+            <a:extLst>
+              <a:ext uri="{28A0092B-C50C-407E-A947-70E740481C1C}">
+                <a14:useLocalDpi xmlns:a14="http://schemas.microsoft.com/office/drawing/2010/main" val="0"/>
+              </a:ext>
+            </a:extLst>
+          </a:blip>
+          <a:stretch>
+            <a:fillRect/>
+          </a:stretch>
+        </p:blipFill>
+        <p:spPr>
+          <a:xfrm>
+            <a:off x="25005584" y="16286407"/>
+            <a:ext cx="10903728" cy="4543220"/>
+          </a:xfrm>
+          <a:prstGeom prst="rect">
+            <a:avLst/>
+          </a:prstGeom>
+          <a:ln>
+            <a:noFill/>
+          </a:ln>
+          <a:effectLst>
+            <a:softEdge rad="112500"/>
+          </a:effectLst>
+        </p:spPr>
+      </p:pic>
+      <p:sp>
+        <p:nvSpPr>
+          <p:cNvPr id="13" name="TextBox 12">
+            <a:extLst>
+              <a:ext uri="{FF2B5EF4-FFF2-40B4-BE49-F238E27FC236}">
+                <a16:creationId xmlns:a16="http://schemas.microsoft.com/office/drawing/2014/main" id="{44E4733C-B7DB-39B5-497B-EE23B0EA195F}"/>
+              </a:ext>
+            </a:extLst>
+          </p:cNvPr>
+          <p:cNvSpPr txBox="1"/>
+          <p:nvPr/>
+        </p:nvSpPr>
+        <p:spPr>
+          <a:xfrm>
+            <a:off x="24870064" y="15511194"/>
+            <a:ext cx="12882295" cy="674251"/>
+          </a:xfrm>
+          <a:prstGeom prst="rect">
+            <a:avLst/>
+          </a:prstGeom>
+          <a:noFill/>
+        </p:spPr>
+        <p:txBody>
+          <a:bodyPr wrap="square" lIns="180052" tIns="90025" rIns="180052" bIns="90025" rtlCol="0" anchor="t">
+            <a:spAutoFit/>
+          </a:bodyPr>
+          <a:lstStyle/>
+          <a:p>
+            <a:r>
+              <a:rPr lang="en-US" sz="3200" dirty="0">
+                <a:latin typeface="Arial"/>
+                <a:cs typeface="Arial"/>
+              </a:rPr>
+              <a:t>Figure 5. Health goal variables presented as three progress bars. </a:t>
+            </a:r>
+            <a:endParaRPr lang="en-US" sz="3200" dirty="0">
+              <a:latin typeface="Arial" panose="020B0604020202020204" pitchFamily="34" charset="0"/>
+              <a:cs typeface="Arial" panose="020B0604020202020204" pitchFamily="34" charset="0"/>
+            </a:endParaRPr>
+          </a:p>
+        </p:txBody>
+      </p:sp>
+      <p:pic>
+        <p:nvPicPr>
+          <p:cNvPr id="18" name="Picture 17" descr="Chart, line chart&#10;&#10;Description automatically generated">
+            <a:extLst>
+              <a:ext uri="{FF2B5EF4-FFF2-40B4-BE49-F238E27FC236}">
+                <a16:creationId xmlns:a16="http://schemas.microsoft.com/office/drawing/2014/main" id="{C12795DF-D094-3712-1AE8-361FC36CE41A}"/>
+              </a:ext>
+            </a:extLst>
+          </p:cNvPr>
+          <p:cNvPicPr>
+            <a:picLocks noChangeAspect="1"/>
+          </p:cNvPicPr>
+          <p:nvPr/>
+        </p:nvPicPr>
+        <p:blipFill>
+          <a:blip r:embed="rId7">
+            <a:extLst>
+              <a:ext uri="{28A0092B-C50C-407E-A947-70E740481C1C}">
+                <a14:useLocalDpi xmlns:a14="http://schemas.microsoft.com/office/drawing/2010/main" val="0"/>
+              </a:ext>
+            </a:extLst>
+          </a:blip>
+          <a:stretch>
+            <a:fillRect/>
+          </a:stretch>
+        </p:blipFill>
+        <p:spPr>
+          <a:xfrm>
+            <a:off x="24792340" y="22627171"/>
+            <a:ext cx="10544141" cy="4018255"/>
+          </a:xfrm>
+          <a:prstGeom prst="rect">
+            <a:avLst/>
+          </a:prstGeom>
+          <a:ln>
+            <a:noFill/>
+          </a:ln>
+          <a:effectLst>
+            <a:softEdge rad="112500"/>
+          </a:effectLst>
+        </p:spPr>
+      </p:pic>
+      <p:sp>
+        <p:nvSpPr>
+          <p:cNvPr id="19" name="TextBox 18">
+            <a:extLst>
+              <a:ext uri="{FF2B5EF4-FFF2-40B4-BE49-F238E27FC236}">
+                <a16:creationId xmlns:a16="http://schemas.microsoft.com/office/drawing/2014/main" id="{C5FD9618-5282-6F83-87F8-C1764A57B521}"/>
+              </a:ext>
+            </a:extLst>
+          </p:cNvPr>
+          <p:cNvSpPr txBox="1"/>
+          <p:nvPr/>
+        </p:nvSpPr>
+        <p:spPr>
+          <a:xfrm>
+            <a:off x="24796755" y="21355159"/>
+            <a:ext cx="12882295" cy="1166693"/>
+          </a:xfrm>
+          <a:prstGeom prst="rect">
+            <a:avLst/>
+          </a:prstGeom>
+          <a:noFill/>
+        </p:spPr>
+        <p:txBody>
+          <a:bodyPr wrap="square" lIns="180052" tIns="90025" rIns="180052" bIns="90025" rtlCol="0" anchor="t">
+            <a:spAutoFit/>
+          </a:bodyPr>
+          <a:lstStyle/>
+          <a:p>
+            <a:r>
+              <a:rPr lang="en-US" sz="3200" dirty="0">
+                <a:latin typeface="Arial"/>
+                <a:cs typeface="Arial"/>
+              </a:rPr>
+              <a:t>Figure 6. A participant’s weekly physical exercise over the course of a month.</a:t>
+            </a:r>
+            <a:endParaRPr lang="en-US" sz="3200" dirty="0">
+              <a:latin typeface="Arial" panose="020B0604020202020204" pitchFamily="34" charset="0"/>
+              <a:cs typeface="Arial" panose="020B0604020202020204" pitchFamily="34" charset="0"/>
+            </a:endParaRPr>
+          </a:p>
+        </p:txBody>
+      </p:sp>
+      <p:pic>
+        <p:nvPicPr>
+          <p:cNvPr id="21" name="Picture 20" descr="Diagram&#10;&#10;Description automatically generated">
+            <a:extLst>
+              <a:ext uri="{FF2B5EF4-FFF2-40B4-BE49-F238E27FC236}">
+                <a16:creationId xmlns:a16="http://schemas.microsoft.com/office/drawing/2014/main" id="{440CE549-60F9-414F-908B-8989A8E84DCB}"/>
+              </a:ext>
+            </a:extLst>
+          </p:cNvPr>
+          <p:cNvPicPr>
+            <a:picLocks noChangeAspect="1"/>
+          </p:cNvPicPr>
+          <p:nvPr/>
+        </p:nvPicPr>
+        <p:blipFill>
+          <a:blip r:embed="rId8">
+            <a:extLst>
+              <a:ext uri="{28A0092B-C50C-407E-A947-70E740481C1C}">
+                <a14:useLocalDpi xmlns:a14="http://schemas.microsoft.com/office/drawing/2010/main" val="0"/>
+              </a:ext>
+            </a:extLst>
+          </a:blip>
+          <a:stretch>
+            <a:fillRect/>
+          </a:stretch>
+        </p:blipFill>
+        <p:spPr>
+          <a:xfrm>
+            <a:off x="13478373" y="6393221"/>
+            <a:ext cx="10362149" cy="2520286"/>
+          </a:xfrm>
+          <a:prstGeom prst="rect">
+            <a:avLst/>
+          </a:prstGeom>
+        </p:spPr>
+      </p:pic>
+      <p:sp>
+        <p:nvSpPr>
+          <p:cNvPr id="2" name="TextBox 1">
+            <a:extLst>
+              <a:ext uri="{FF2B5EF4-FFF2-40B4-BE49-F238E27FC236}">
+                <a16:creationId xmlns:a16="http://schemas.microsoft.com/office/drawing/2014/main" id="{C184F193-7A82-9FBE-8341-1F2739E9B08D}"/>
+              </a:ext>
+            </a:extLst>
+          </p:cNvPr>
+          <p:cNvSpPr txBox="1"/>
+          <p:nvPr/>
+        </p:nvSpPr>
+        <p:spPr>
+          <a:xfrm>
+            <a:off x="625915" y="23298100"/>
+            <a:ext cx="11824596" cy="9078254"/>
+          </a:xfrm>
+          <a:prstGeom prst="rect">
+            <a:avLst/>
+          </a:prstGeom>
+          <a:noFill/>
+        </p:spPr>
+        <p:txBody>
+          <a:bodyPr wrap="square" rtlCol="0">
+            <a:spAutoFit/>
+          </a:bodyPr>
+          <a:lstStyle/>
+          <a:p>
+            <a:pPr marR="575194" algn="just">
+              <a:lnSpc>
+                <a:spcPts val="4085"/>
+              </a:lnSpc>
+              <a:spcBef>
+                <a:spcPts val="2102"/>
+              </a:spcBef>
+            </a:pPr>
+            <a:r>
+              <a:rPr lang="en-US" sz="5400" b="1" cap="all" spc="258" dirty="0">
+                <a:solidFill>
+                  <a:srgbClr val="A80432"/>
+                </a:solidFill>
+                <a:latin typeface="Arial"/>
+                <a:cs typeface="Arial"/>
+              </a:rPr>
+              <a:t>Designing Solution</a:t>
+            </a:r>
+            <a:endParaRPr lang="en-US" sz="5400" b="1" cap="all" dirty="0">
+              <a:solidFill>
+                <a:srgbClr val="A80432"/>
+              </a:solidFill>
+              <a:latin typeface="Arial"/>
+              <a:cs typeface="Arial"/>
+            </a:endParaRPr>
+          </a:p>
+          <a:p>
+            <a:pPr marL="562691" indent="-562691">
+              <a:spcBef>
+                <a:spcPts val="1182"/>
+              </a:spcBef>
+              <a:buFont typeface="Arial" panose="020B0604020202020204" pitchFamily="34" charset="0"/>
+              <a:buChar char="•"/>
+            </a:pPr>
+            <a:r>
+              <a:rPr lang="en-US" sz="4000" dirty="0">
+                <a:latin typeface="Calibri"/>
+                <a:ea typeface="SimSun"/>
+                <a:cs typeface="Times New Roman"/>
+              </a:rPr>
+              <a:t>Researchers have many ideas for variables that can be collected and measured from EMMA data.</a:t>
+            </a:r>
+          </a:p>
+          <a:p>
+            <a:pPr marL="562691" indent="-562691">
+              <a:spcBef>
+                <a:spcPts val="1182"/>
+              </a:spcBef>
+              <a:buFont typeface="Arial" panose="020B0604020202020204" pitchFamily="34" charset="0"/>
+              <a:buChar char="•"/>
+            </a:pPr>
+            <a:r>
+              <a:rPr lang="en-US" sz="4000" dirty="0">
+                <a:latin typeface="Calibri"/>
+                <a:ea typeface="SimSun"/>
+                <a:cs typeface="Times New Roman"/>
+              </a:rPr>
+              <a:t>Problem: How to easily define new variables that can then be added to the data wrangling system, and how to store these calculations efficiently.</a:t>
+            </a:r>
+          </a:p>
+          <a:p>
+            <a:pPr marL="562691" indent="-562691">
+              <a:spcBef>
+                <a:spcPts val="1182"/>
+              </a:spcBef>
+              <a:buFont typeface="Arial" panose="020B0604020202020204" pitchFamily="34" charset="0"/>
+              <a:buChar char="•"/>
+            </a:pPr>
+            <a:endParaRPr lang="en-US" sz="4000" dirty="0">
+              <a:latin typeface="Calibri"/>
+              <a:ea typeface="SimSun"/>
+              <a:cs typeface="Times New Roman"/>
+            </a:endParaRPr>
+          </a:p>
+          <a:p>
+            <a:pPr marL="562691" indent="-562691">
+              <a:spcBef>
+                <a:spcPts val="1182"/>
+              </a:spcBef>
+              <a:buFont typeface="Arial" panose="020B0604020202020204" pitchFamily="34" charset="0"/>
+              <a:buChar char="•"/>
+            </a:pPr>
+            <a:r>
+              <a:rPr lang="en-US" sz="4000" dirty="0">
+                <a:latin typeface="Calibri"/>
+                <a:ea typeface="SimSun"/>
+                <a:cs typeface="Times New Roman"/>
+              </a:rPr>
+              <a:t>Data wrangling prep….</a:t>
+            </a:r>
+          </a:p>
+          <a:p>
+            <a:pPr marL="562691" indent="-562691">
+              <a:spcBef>
+                <a:spcPts val="1182"/>
+              </a:spcBef>
+              <a:buFont typeface="Arial" panose="020B0604020202020204" pitchFamily="34" charset="0"/>
+              <a:buChar char="•"/>
+            </a:pPr>
+            <a:r>
+              <a:rPr lang="en-US" sz="4000" dirty="0">
+                <a:latin typeface="Calibri"/>
+                <a:ea typeface="SimSun"/>
+                <a:cs typeface="Times New Roman"/>
+              </a:rPr>
+              <a:t>Project Aim 1 Solution: Data Wrangling</a:t>
+            </a:r>
+          </a:p>
+          <a:p>
+            <a:pPr marL="562691" indent="-562691">
+              <a:spcBef>
+                <a:spcPts val="1182"/>
+              </a:spcBef>
+              <a:buFont typeface="Arial" panose="020B0604020202020204" pitchFamily="34" charset="0"/>
+              <a:buChar char="•"/>
+            </a:pPr>
+            <a:r>
+              <a:rPr lang="en-US" sz="4000" dirty="0">
+                <a:latin typeface="Calibri"/>
+                <a:ea typeface="SimSun"/>
+                <a:cs typeface="Times New Roman"/>
+              </a:rPr>
+              <a:t>Project Aim 2 Solution: Dashboard</a:t>
+            </a:r>
+          </a:p>
+          <a:p>
+            <a:pPr marL="562691" indent="-562691">
+              <a:spcBef>
+                <a:spcPts val="1182"/>
+              </a:spcBef>
+              <a:buFont typeface="Arial" panose="020B0604020202020204" pitchFamily="34" charset="0"/>
+              <a:buChar char="•"/>
+            </a:pPr>
+            <a:r>
+              <a:rPr lang="en-US" sz="4000" dirty="0">
+                <a:latin typeface="Calibri"/>
+                <a:ea typeface="SimSun"/>
+                <a:cs typeface="Times New Roman"/>
+              </a:rPr>
+              <a:t>Receive feedback from researchers and clinicians to create new variables and better metrics.</a:t>
+            </a:r>
+            <a:endParaRPr lang="en-US" sz="4000" dirty="0">
+              <a:latin typeface="Arial" panose="020B0604020202020204" pitchFamily="34" charset="0"/>
+              <a:cs typeface="Arial" panose="020B0604020202020204" pitchFamily="34" charset="0"/>
+            </a:endParaRPr>
+          </a:p>
+          <a:p>
+            <a:endParaRPr lang="en-US" dirty="0"/>
+          </a:p>
+        </p:txBody>
+      </p:sp>
+      <p:pic>
+        <p:nvPicPr>
+          <p:cNvPr id="17" name="Picture 16">
+            <a:extLst>
+              <a:ext uri="{FF2B5EF4-FFF2-40B4-BE49-F238E27FC236}">
+                <a16:creationId xmlns:a16="http://schemas.microsoft.com/office/drawing/2014/main" id="{709BA4AF-0F21-3B2E-CDBA-01E52BD60EE2}"/>
+              </a:ext>
+            </a:extLst>
+          </p:cNvPr>
+          <p:cNvPicPr>
+            <a:picLocks noChangeAspect="1"/>
+          </p:cNvPicPr>
+          <p:nvPr/>
+        </p:nvPicPr>
+        <p:blipFill>
+          <a:blip r:embed="rId9"/>
+          <a:stretch>
+            <a:fillRect/>
+          </a:stretch>
+        </p:blipFill>
+        <p:spPr>
+          <a:xfrm>
+            <a:off x="2066502" y="15284523"/>
+            <a:ext cx="8554751" cy="6489811"/>
+          </a:xfrm>
+          <a:prstGeom prst="rect">
+            <a:avLst/>
+          </a:prstGeom>
+        </p:spPr>
+      </p:pic>
+      <p:sp>
+        <p:nvSpPr>
+          <p:cNvPr id="20" name="object 10">
+            <a:extLst>
+              <a:ext uri="{FF2B5EF4-FFF2-40B4-BE49-F238E27FC236}">
+                <a16:creationId xmlns:a16="http://schemas.microsoft.com/office/drawing/2014/main" id="{61BD3F03-F56D-D1F1-4EE2-6265930A73D8}"/>
+              </a:ext>
+            </a:extLst>
+          </p:cNvPr>
+          <p:cNvSpPr txBox="1"/>
+          <p:nvPr/>
+        </p:nvSpPr>
+        <p:spPr>
+          <a:xfrm>
+            <a:off x="24915178" y="27274585"/>
+            <a:ext cx="13703955" cy="2757165"/>
+          </a:xfrm>
+          <a:prstGeom prst="rect">
+            <a:avLst/>
+          </a:prstGeom>
+        </p:spPr>
+        <p:txBody>
+          <a:bodyPr vert="horz" wrap="square" lIns="0" tIns="0" rIns="0" bIns="0" rtlCol="0">
+            <a:spAutoFit/>
+          </a:bodyPr>
+          <a:lstStyle/>
+          <a:p>
+            <a:pPr>
+              <a:lnSpc>
+                <a:spcPts val="4666"/>
+              </a:lnSpc>
+              <a:tabLst>
+                <a:tab pos="3000684" algn="l"/>
+              </a:tabLst>
+            </a:pPr>
+            <a:r>
+              <a:rPr lang="en-US" sz="5400" b="1" cap="all" spc="258" dirty="0">
+                <a:solidFill>
+                  <a:srgbClr val="A80432"/>
+                </a:solidFill>
+                <a:latin typeface="Arial" panose="020B0604020202020204" pitchFamily="34" charset="0"/>
+                <a:cs typeface="Arial" panose="020B0604020202020204" pitchFamily="34" charset="0"/>
+              </a:rPr>
+              <a:t>Future Directions</a:t>
+            </a:r>
+          </a:p>
+          <a:p>
+            <a:pPr marL="562691" indent="-562691">
+              <a:spcBef>
+                <a:spcPts val="1182"/>
+              </a:spcBef>
+              <a:buFont typeface="Arial"/>
+              <a:buChar char="•"/>
+            </a:pPr>
+            <a:r>
+              <a:rPr lang="en-US" sz="4000" dirty="0">
+                <a:latin typeface="Arial" panose="020B0604020202020204" pitchFamily="34" charset="0"/>
+                <a:ea typeface="+mn-lt"/>
+                <a:cs typeface="+mn-lt"/>
+              </a:rPr>
+              <a:t>Attach data wrangling and Dashboard to the EMMA mainframe</a:t>
+            </a:r>
+          </a:p>
+          <a:p>
+            <a:pPr marL="562691" indent="-562691">
+              <a:spcBef>
+                <a:spcPts val="1182"/>
+              </a:spcBef>
+              <a:buFont typeface="Arial"/>
+              <a:buChar char="•"/>
+            </a:pPr>
+            <a:r>
+              <a:rPr lang="en-US" sz="4000" dirty="0">
+                <a:latin typeface="Arial" panose="020B0604020202020204" pitchFamily="34" charset="0"/>
+                <a:ea typeface="+mn-lt"/>
+                <a:cs typeface="+mn-lt"/>
+              </a:rPr>
+              <a:t>Create new variables for new studies</a:t>
+            </a:r>
+            <a:endParaRPr lang="en-US" sz="4000" dirty="0">
+              <a:latin typeface="Arial" panose="020B0604020202020204" pitchFamily="34" charset="0"/>
+              <a:cs typeface="Arial" panose="020B0604020202020204" pitchFamily="34" charset="0"/>
+            </a:endParaRPr>
+          </a:p>
+        </p:txBody>
+      </p:sp>
+      <p:sp>
+        <p:nvSpPr>
+          <p:cNvPr id="22" name="object 10">
+            <a:extLst>
+              <a:ext uri="{FF2B5EF4-FFF2-40B4-BE49-F238E27FC236}">
+                <a16:creationId xmlns:a16="http://schemas.microsoft.com/office/drawing/2014/main" id="{9C9C2F5F-C7BB-D8A2-A76B-C33EFD86CFE5}"/>
+              </a:ext>
+            </a:extLst>
+          </p:cNvPr>
+          <p:cNvSpPr txBox="1"/>
+          <p:nvPr/>
+        </p:nvSpPr>
+        <p:spPr>
+          <a:xfrm>
+            <a:off x="24915178" y="30608299"/>
+            <a:ext cx="11912500" cy="1895391"/>
+          </a:xfrm>
+          <a:prstGeom prst="rect">
+            <a:avLst/>
+          </a:prstGeom>
+        </p:spPr>
+        <p:txBody>
+          <a:bodyPr vert="horz" wrap="square" lIns="0" tIns="0" rIns="0" bIns="0" rtlCol="0">
+            <a:spAutoFit/>
+          </a:bodyPr>
+          <a:lstStyle/>
+          <a:p>
+            <a:pPr>
+              <a:lnSpc>
+                <a:spcPts val="4666"/>
+              </a:lnSpc>
+              <a:tabLst>
+                <a:tab pos="3000684" algn="l"/>
+              </a:tabLst>
+            </a:pPr>
+            <a:r>
+              <a:rPr lang="en-US" sz="5515" b="1" cap="all" spc="258" dirty="0">
+                <a:solidFill>
+                  <a:srgbClr val="A80432"/>
+                </a:solidFill>
+                <a:latin typeface="Arial" panose="020B0604020202020204" pitchFamily="34" charset="0"/>
+                <a:cs typeface="Arial" panose="020B0604020202020204" pitchFamily="34" charset="0"/>
+              </a:rPr>
+              <a:t>Support and Contact</a:t>
+            </a:r>
+            <a:endParaRPr lang="en-US" sz="2069" baseline="30000" dirty="0">
+              <a:latin typeface="Arial" panose="020B0604020202020204" pitchFamily="34" charset="0"/>
+              <a:cs typeface="Arial" panose="020B0604020202020204" pitchFamily="34" charset="0"/>
+            </a:endParaRPr>
+          </a:p>
+          <a:p>
+            <a:pPr>
+              <a:tabLst>
+                <a:tab pos="3000684" algn="l"/>
+              </a:tabLst>
+            </a:pPr>
+            <a:r>
+              <a:rPr lang="en-US" sz="2800" dirty="0">
+                <a:latin typeface="Arial" panose="020B0604020202020204" pitchFamily="34" charset="0"/>
+                <a:cs typeface="Arial" panose="020B0604020202020204" pitchFamily="34" charset="0"/>
+              </a:rPr>
+              <a:t>WSU/NIH </a:t>
+            </a:r>
+            <a:r>
+              <a:rPr lang="en-US" sz="2800" dirty="0" err="1">
+                <a:latin typeface="Arial" panose="020B0604020202020204" pitchFamily="34" charset="0"/>
+                <a:cs typeface="Arial" panose="020B0604020202020204" pitchFamily="34" charset="0"/>
+              </a:rPr>
+              <a:t>Gerontechnology</a:t>
+            </a:r>
+            <a:r>
+              <a:rPr lang="en-US" sz="2800" dirty="0">
+                <a:latin typeface="Arial" panose="020B0604020202020204" pitchFamily="34" charset="0"/>
+                <a:cs typeface="Arial" panose="020B0604020202020204" pitchFamily="34" charset="0"/>
+              </a:rPr>
+              <a:t>-Focused Student Undergraduate Research Experience (GSUR)</a:t>
+            </a:r>
+          </a:p>
+          <a:p>
+            <a:pPr algn="just">
+              <a:tabLst>
+                <a:tab pos="3000684" algn="l"/>
+              </a:tabLst>
+            </a:pPr>
+            <a:r>
+              <a:rPr lang="en-US" sz="2800" dirty="0">
+                <a:latin typeface="Arial" panose="020B0604020202020204" pitchFamily="34" charset="0"/>
+                <a:cs typeface="Arial" panose="020B0604020202020204" pitchFamily="34" charset="0"/>
+                <a:hlinkClick r:id="rId10"/>
+              </a:rPr>
+              <a:t>catherine.luna@wsu.edu</a:t>
+            </a:r>
+            <a:r>
+              <a:rPr lang="en-US" sz="2800" dirty="0">
+                <a:latin typeface="Arial" panose="020B0604020202020204" pitchFamily="34" charset="0"/>
+                <a:cs typeface="Arial" panose="020B0604020202020204" pitchFamily="34" charset="0"/>
+              </a:rPr>
+              <a:t>; Lab Twitter: @</a:t>
+            </a:r>
+            <a:r>
+              <a:rPr lang="en-US" sz="2800" dirty="0" err="1">
+                <a:latin typeface="Arial" panose="020B0604020202020204" pitchFamily="34" charset="0"/>
+                <a:cs typeface="Arial" panose="020B0604020202020204" pitchFamily="34" charset="0"/>
+              </a:rPr>
+              <a:t>WSUNeuroTechLab</a:t>
+            </a:r>
+            <a:endParaRPr lang="en-US" sz="2800" dirty="0">
+              <a:latin typeface="Arial" panose="020B0604020202020204" pitchFamily="34" charset="0"/>
+              <a:cs typeface="Arial" panose="020B0604020202020204" pitchFamily="34" charset="0"/>
+            </a:endParaRPr>
+          </a:p>
+        </p:txBody>
+      </p:sp>
+      <p:sp>
+        <p:nvSpPr>
+          <p:cNvPr id="11" name="TextBox 10">
+            <a:extLst>
+              <a:ext uri="{FF2B5EF4-FFF2-40B4-BE49-F238E27FC236}">
+                <a16:creationId xmlns:a16="http://schemas.microsoft.com/office/drawing/2014/main" id="{097669DF-6E07-1279-C5AC-B8024A902918}"/>
+              </a:ext>
+            </a:extLst>
+          </p:cNvPr>
+          <p:cNvSpPr txBox="1"/>
+          <p:nvPr/>
+        </p:nvSpPr>
+        <p:spPr>
+          <a:xfrm>
+            <a:off x="723181" y="14375165"/>
+            <a:ext cx="11241395" cy="674251"/>
+          </a:xfrm>
+          <a:prstGeom prst="rect">
+            <a:avLst/>
+          </a:prstGeom>
+          <a:noFill/>
+        </p:spPr>
+        <p:txBody>
+          <a:bodyPr wrap="square" lIns="180052" tIns="90025" rIns="180052" bIns="90025" rtlCol="0" anchor="t">
+            <a:spAutoFit/>
+          </a:bodyPr>
+          <a:lstStyle/>
+          <a:p>
+            <a:r>
+              <a:rPr lang="en-US" sz="3200" dirty="0">
+                <a:latin typeface="Arial"/>
+                <a:cs typeface="Arial"/>
+              </a:rPr>
+              <a:t>Figure 1. EMMA app home screen</a:t>
+            </a:r>
+            <a:endParaRPr lang="en-US" sz="3200" dirty="0">
+              <a:latin typeface="Arial" panose="020B0604020202020204" pitchFamily="34" charset="0"/>
+              <a:cs typeface="Arial" panose="020B0604020202020204" pitchFamily="34" charset="0"/>
+            </a:endParaRPr>
+          </a:p>
+        </p:txBody>
+      </p:sp>
+      <p:pic>
+        <p:nvPicPr>
+          <p:cNvPr id="15" name="Picture 14">
+            <a:extLst>
+              <a:ext uri="{FF2B5EF4-FFF2-40B4-BE49-F238E27FC236}">
+                <a16:creationId xmlns:a16="http://schemas.microsoft.com/office/drawing/2014/main" id="{D3576992-C49B-78AA-8D05-F17F3A4DF954}"/>
+              </a:ext>
+            </a:extLst>
+          </p:cNvPr>
+          <p:cNvPicPr>
+            <a:picLocks noChangeAspect="1"/>
+          </p:cNvPicPr>
+          <p:nvPr/>
+        </p:nvPicPr>
+        <p:blipFill>
+          <a:blip r:embed="rId11"/>
+          <a:stretch>
+            <a:fillRect/>
+          </a:stretch>
+        </p:blipFill>
+        <p:spPr>
+          <a:xfrm>
+            <a:off x="14303167" y="21103968"/>
+            <a:ext cx="8712560" cy="7549199"/>
+          </a:xfrm>
+          <a:prstGeom prst="rect">
+            <a:avLst/>
+          </a:prstGeom>
+          <a:ln w="3175" cap="sq" cmpd="thickThin">
+            <a:solidFill>
+              <a:srgbClr val="000000"/>
+            </a:solidFill>
+            <a:prstDash val="solid"/>
+            <a:miter lim="800000"/>
+          </a:ln>
+          <a:effectLst>
+            <a:innerShdw blurRad="76200">
+              <a:srgbClr val="000000"/>
+            </a:innerShdw>
+          </a:effectLst>
+        </p:spPr>
+      </p:pic>
     </p:spTree>
   </p:cSld>
   <p:clrMapOvr>
     <a:masterClrMapping/>
   </p:clrMapOvr>
+  <p:extLst>
+    <p:ext uri="{6950BFC3-D8DA-4A85-94F7-54DA5524770B}">
+      <p188:commentRel xmlns:p188="http://schemas.microsoft.com/office/powerpoint/2018/8/main" r:id="rId3"/>
+    </p:ext>
+  </p:extLst>
 </p:sld>
 </file>
 
@@ -3926,12 +4511,6 @@
 </file>
 
 <file path=customXml/item2.xml><?xml version="1.0" encoding="utf-8"?>
-<p:properties xmlns:p="http://schemas.microsoft.com/office/2006/metadata/properties" xmlns:xsi="http://www.w3.org/2001/XMLSchema-instance" xmlns:pc="http://schemas.microsoft.com/office/infopath/2007/PartnerControls">
-  <documentManagement/>
-</p:properties>
-</file>
-
-<file path=customXml/item3.xml><?xml version="1.0" encoding="utf-8"?>
 <ct:contentTypeSchema xmlns:ct="http://schemas.microsoft.com/office/2006/metadata/contentType" xmlns:ma="http://schemas.microsoft.com/office/2006/metadata/properties/metaAttributes" ct:_="" ma:_="" ma:contentTypeName="Document" ma:contentTypeID="0x0101000756E07B8C6FDF4AA9C8148FCBB0BCEE" ma:contentTypeVersion="14" ma:contentTypeDescription="Create a new document." ma:contentTypeScope="" ma:versionID="a9ae2f9572ce96483200cf1f369efa5e">
   <xsd:schema xmlns:xsd="http://www.w3.org/2001/XMLSchema" xmlns:xs="http://www.w3.org/2001/XMLSchema" xmlns:p="http://schemas.microsoft.com/office/2006/metadata/properties" xmlns:ns3="29140ecd-3393-4559-a649-14a344578679" xmlns:ns4="048b29e2-e056-46d7-9f03-f58d16224128" targetNamespace="http://schemas.microsoft.com/office/2006/metadata/properties" ma:root="true" ma:fieldsID="d7e719c34aab8d9d36249f23f02e4351" ns3:_="" ns4:_="">
     <xsd:import namespace="29140ecd-3393-4559-a649-14a344578679"/>
@@ -4160,6 +4739,12 @@
 </ct:contentTypeSchema>
 </file>
 
+<file path=customXml/item3.xml><?xml version="1.0" encoding="utf-8"?>
+<p:properties xmlns:p="http://schemas.microsoft.com/office/2006/metadata/properties" xmlns:xsi="http://www.w3.org/2001/XMLSchema-instance" xmlns:pc="http://schemas.microsoft.com/office/infopath/2007/PartnerControls">
+  <documentManagement/>
+</p:properties>
+</file>
+
 <file path=customXml/itemProps1.xml><?xml version="1.0" encoding="utf-8"?>
 <ds:datastoreItem xmlns:ds="http://schemas.openxmlformats.org/officeDocument/2006/customXml" ds:itemID="{F8EACEB1-D37D-4F88-A95F-DA07D678361A}">
   <ds:schemaRefs>
@@ -4169,23 +4754,6 @@
 </file>
 
 <file path=customXml/itemProps2.xml><?xml version="1.0" encoding="utf-8"?>
-<ds:datastoreItem xmlns:ds="http://schemas.openxmlformats.org/officeDocument/2006/customXml" ds:itemID="{8CC7F08A-AB99-4D03-9BF1-0F1D27BC84BE}">
-  <ds:schemaRefs>
-    <ds:schemaRef ds:uri="http://purl.org/dc/elements/1.1/"/>
-    <ds:schemaRef ds:uri="http://www.w3.org/XML/1998/namespace"/>
-    <ds:schemaRef ds:uri="http://schemas.microsoft.com/office/2006/documentManagement/types"/>
-    <ds:schemaRef ds:uri="http://purl.org/dc/dcmitype/"/>
-    <ds:schemaRef ds:uri="29140ecd-3393-4559-a649-14a344578679"/>
-    <ds:schemaRef ds:uri="http://purl.org/dc/terms/"/>
-    <ds:schemaRef ds:uri="http://schemas.microsoft.com/office/infopath/2007/PartnerControls"/>
-    <ds:schemaRef ds:uri="http://schemas.openxmlformats.org/package/2006/metadata/core-properties"/>
-    <ds:schemaRef ds:uri="048b29e2-e056-46d7-9f03-f58d16224128"/>
-    <ds:schemaRef ds:uri="http://schemas.microsoft.com/office/2006/metadata/properties"/>
-  </ds:schemaRefs>
-</ds:datastoreItem>
-</file>
-
-<file path=customXml/itemProps3.xml><?xml version="1.0" encoding="utf-8"?>
 <ds:datastoreItem xmlns:ds="http://schemas.openxmlformats.org/officeDocument/2006/customXml" ds:itemID="{6532072A-EE81-4BBC-806E-5231D91197A6}">
   <ds:schemaRefs>
     <ds:schemaRef ds:uri="http://schemas.microsoft.com/office/2006/metadata/contentType"/>
@@ -4202,4 +4770,21 @@
     <ds:schemaRef ds:uri="http://schemas.microsoft.com/internal/obd"/>
   </ds:schemaRefs>
 </ds:datastoreItem>
+</file>
+
+<file path=customXml/itemProps3.xml><?xml version="1.0" encoding="utf-8"?>
+<ds:datastoreItem xmlns:ds="http://schemas.openxmlformats.org/officeDocument/2006/customXml" ds:itemID="{8CC7F08A-AB99-4D03-9BF1-0F1D27BC84BE}">
+  <ds:schemaRefs>
+    <ds:schemaRef ds:uri="http://purl.org/dc/elements/1.1/"/>
+    <ds:schemaRef ds:uri="http://www.w3.org/XML/1998/namespace"/>
+    <ds:schemaRef ds:uri="http://schemas.microsoft.com/office/2006/documentManagement/types"/>
+    <ds:schemaRef ds:uri="http://purl.org/dc/dcmitype/"/>
+    <ds:schemaRef ds:uri="29140ecd-3393-4559-a649-14a344578679"/>
+    <ds:schemaRef ds:uri="http://purl.org/dc/terms/"/>
+    <ds:schemaRef ds:uri="http://schemas.microsoft.com/office/infopath/2007/PartnerControls"/>
+    <ds:schemaRef ds:uri="http://schemas.openxmlformats.org/package/2006/metadata/core-properties"/>
+    <ds:schemaRef ds:uri="048b29e2-e056-46d7-9f03-f58d16224128"/>
+    <ds:schemaRef ds:uri="http://schemas.microsoft.com/office/2006/metadata/properties"/>
+  </ds:schemaRefs>
+</ds:datastoreItem>
 </file>
</xml_diff>